<commit_message>
ready to go slide
</commit_message>
<xml_diff>
--- a/slide.pptx
+++ b/slide.pptx
@@ -3886,8 +3886,8 @@
         </p:nvSpPr>
         <p:spPr>
           <a:xfrm>
-            <a:off x="901148" y="1214438"/>
-            <a:ext cx="10535478" cy="2387600"/>
+            <a:off x="901147" y="1214438"/>
+            <a:ext cx="10747513" cy="2387600"/>
           </a:xfrm>
         </p:spPr>
         <p:txBody>
@@ -3902,7 +3902,7 @@
                   <a:schemeClr val="accent1"/>
                 </a:solidFill>
               </a:rPr>
-              <a:t>Overcome challenges of </a:t>
+              <a:t>Hierarchical geo-based micro-services</a:t>
             </a:r>
             <a:br>
               <a:rPr lang="en-US" dirty="0">
@@ -3917,7 +3917,22 @@
                   <a:schemeClr val="accent1"/>
                 </a:solidFill>
               </a:rPr>
-              <a:t>tracking-searching problem by hierarchical geo-based micro-services</a:t>
+              <a:t>to overcome challenges of </a:t>
+            </a:r>
+            <a:br>
+              <a:rPr lang="en-US" dirty="0">
+                <a:solidFill>
+                  <a:schemeClr val="accent1"/>
+                </a:solidFill>
+              </a:rPr>
+            </a:br>
+            <a:r>
+              <a:rPr lang="en-US" dirty="0">
+                <a:solidFill>
+                  <a:schemeClr val="accent1"/>
+                </a:solidFill>
+              </a:rPr>
+              <a:t>tracking-searching problem</a:t>
             </a:r>
             <a:endParaRPr lang="en-GB" dirty="0">
               <a:solidFill>
@@ -6804,7 +6819,7 @@
           <a:p>
             <a:r>
               <a:rPr lang="en-GB" dirty="0"/>
-              <a:t>2 machine for REST </a:t>
+              <a:t>2 machines for REST </a:t>
             </a:r>
             <a:r>
               <a:rPr lang="en-GB" dirty="0" err="1"/>
@@ -7309,7 +7324,7 @@
         </p:spPr>
         <p:txBody>
           <a:bodyPr>
-            <a:normAutofit lnSpcReduction="10000"/>
+            <a:normAutofit/>
           </a:bodyPr>
           <a:lstStyle/>
           <a:p>
@@ -7327,14 +7342,14 @@
           <a:p>
             <a:r>
               <a:rPr lang="en-US" dirty="0"/>
-              <a:t>Each micro-service node handle 2 hub-based message topics from specific Kafka</a:t>
+              <a:t>Each micro-service node handle 2 hub-based message topics (tracking/searching) from a specific Kafka</a:t>
             </a:r>
           </a:p>
           <a:p>
             <a:pPr lvl="1"/>
             <a:r>
               <a:rPr lang="en-US" dirty="0"/>
-              <a:t>Total 69x2 (tracking/searching) topics for test case.</a:t>
+              <a:t>Total 69x2 topics for test case.</a:t>
             </a:r>
           </a:p>
           <a:p>
@@ -7361,13 +7376,6 @@
             </a:r>
           </a:p>
           <a:p>
-            <a:pPr lvl="1"/>
-            <a:r>
-              <a:rPr lang="en-GB" dirty="0"/>
-              <a:t>Separate storage so that no need kind of node like MongoDB master (decentralized)</a:t>
-            </a:r>
-          </a:p>
-          <a:p>
             <a:r>
               <a:rPr lang="en-US" dirty="0"/>
               <a:t>Each hub ~ [</a:t>
@@ -7384,7 +7392,7 @@
           <a:p>
             <a:r>
               <a:rPr lang="en-US" dirty="0"/>
-              <a:t>Hubs grouped by zone (each zone has 1 Kafka server)</a:t>
+              <a:t>Hubs grouped by zone (each zone covered by 1 Kafka server)</a:t>
             </a:r>
             <a:endParaRPr lang="en-GB" dirty="0"/>
           </a:p>
@@ -8032,7 +8040,7 @@
         </p:blipFill>
         <p:spPr>
           <a:xfrm>
-            <a:off x="5606154" y="3844252"/>
+            <a:off x="5606154" y="3990024"/>
             <a:ext cx="617807" cy="617807"/>
           </a:xfrm>
           <a:prstGeom prst="rect">
@@ -8071,7 +8079,7 @@
         </p:blipFill>
         <p:spPr>
           <a:xfrm>
-            <a:off x="5799584" y="3982270"/>
+            <a:off x="5799584" y="4128042"/>
             <a:ext cx="617807" cy="617807"/>
           </a:xfrm>
           <a:prstGeom prst="rect">
@@ -8110,7 +8118,7 @@
         </p:blipFill>
         <p:spPr>
           <a:xfrm>
-            <a:off x="5993014" y="4062730"/>
+            <a:off x="5993014" y="4208502"/>
             <a:ext cx="617807" cy="617807"/>
           </a:xfrm>
           <a:prstGeom prst="rect">
@@ -8568,7 +8576,7 @@
         <p:spPr>
           <a:xfrm>
             <a:off x="4464817" y="2862401"/>
-            <a:ext cx="1043269" cy="1020940"/>
+            <a:ext cx="1141337" cy="1127623"/>
           </a:xfrm>
           <a:prstGeom prst="straightConnector1">
             <a:avLst/>
@@ -8708,8 +8716,8 @@
         </p:nvCxnSpPr>
         <p:spPr>
           <a:xfrm>
-            <a:off x="6778659" y="4414733"/>
-            <a:ext cx="859264" cy="84812"/>
+            <a:off x="6765376" y="4499545"/>
+            <a:ext cx="872547" cy="0"/>
           </a:xfrm>
           <a:prstGeom prst="straightConnector1">
             <a:avLst/>
@@ -9267,29 +9275,13 @@
           <a:p>
             <a:r>
               <a:rPr lang="en-GB" dirty="0"/>
-              <a:t>1 machine for REST </a:t>
-            </a:r>
-            <a:r>
-              <a:rPr lang="en-GB" dirty="0" err="1"/>
-              <a:t>api</a:t>
-            </a:r>
+              <a:t>1 machine for REST API on Netty to handle tracking requests</a:t>
+            </a:r>
+          </a:p>
+          <a:p>
             <a:r>
               <a:rPr lang="en-GB" dirty="0"/>
-              <a:t> on Netty to handle tracking requests</a:t>
-            </a:r>
-          </a:p>
-          <a:p>
-            <a:r>
-              <a:rPr lang="en-GB" dirty="0"/>
-              <a:t>1 machine for REST </a:t>
-            </a:r>
-            <a:r>
-              <a:rPr lang="en-GB" dirty="0" err="1"/>
-              <a:t>api</a:t>
-            </a:r>
-            <a:r>
-              <a:rPr lang="en-GB" dirty="0"/>
-              <a:t> on Netty to handle searching requests</a:t>
+              <a:t>1 machine for REST API on Netty to handle searching requests</a:t>
             </a:r>
           </a:p>
           <a:p>
@@ -12505,7 +12497,7 @@
         </p:nvSpPr>
         <p:spPr>
           <a:xfrm>
-            <a:off x="1074911" y="3102294"/>
+            <a:off x="1082229" y="3493044"/>
             <a:ext cx="914400" cy="612648"/>
           </a:xfrm>
           <a:prstGeom prst="cloudCallout">
@@ -12599,7 +12591,7 @@
         </p:nvSpPr>
         <p:spPr>
           <a:xfrm>
-            <a:off x="1074911" y="5280434"/>
+            <a:off x="1033626" y="5043408"/>
             <a:ext cx="914400" cy="612648"/>
           </a:xfrm>
           <a:prstGeom prst="cloudCallout">
@@ -13075,7 +13067,7 @@
         </p:nvSpPr>
         <p:spPr>
           <a:xfrm>
-            <a:off x="1074911" y="6123543"/>
+            <a:off x="1062523" y="5828939"/>
             <a:ext cx="815926" cy="369332"/>
           </a:xfrm>
           <a:prstGeom prst="rect">
@@ -15691,7 +15683,7 @@
           <a:p>
             <a:r>
               <a:rPr lang="en-US" dirty="0"/>
-              <a:t>Conclusions</a:t>
+              <a:t>Conclusions - Micro-services is …</a:t>
             </a:r>
             <a:endParaRPr lang="en-GB" dirty="0"/>
           </a:p>
@@ -15719,15 +15711,6 @@
             <a:normAutofit/>
           </a:bodyPr>
           <a:lstStyle/>
-          <a:p>
-            <a:pPr marL="0" indent="0">
-              <a:buNone/>
-            </a:pPr>
-            <a:r>
-              <a:rPr lang="en-US" sz="3200" dirty="0"/>
-              <a:t>Micro-services is</a:t>
-            </a:r>
-          </a:p>
           <a:p>
             <a:r>
               <a:rPr lang="en-US" dirty="0"/>
@@ -16929,7 +16912,7 @@
           <a:p>
             <a:r>
               <a:rPr lang="en-GB" dirty="0"/>
-              <a:t>Serving requests from 60K clients</a:t>
+              <a:t>Serving searching requests from 60K clients</a:t>
             </a:r>
           </a:p>
           <a:p>

</xml_diff>